<commit_message>
Updated List of presentations
</commit_message>
<xml_diff>
--- a/Database Design Chat/Database Design Chat 015 NULL.pptx
+++ b/Database Design Chat/Database Design Chat 015 NULL.pptx
@@ -5821,8 +5821,13 @@
           <a:p>
             <a:r>
               <a:rPr lang="en-US" sz="4800" dirty="0"/>
-              <a:t>Database Design Chat 010</a:t>
-            </a:r>
+              <a:t>Database Design </a:t>
+            </a:r>
+            <a:r>
+              <a:rPr lang="en-US" sz="4800"/>
+              <a:t>Chat 015</a:t>
+            </a:r>
+            <a:endParaRPr lang="en-US" sz="4800" dirty="0"/>
           </a:p>
         </p:txBody>
       </p:sp>

</xml_diff>

<commit_message>
Update Database Design Chat 015 NULL.pptx
</commit_message>
<xml_diff>
--- a/Database Design Chat/Database Design Chat 015 NULL.pptx
+++ b/Database Design Chat/Database Design Chat 015 NULL.pptx
@@ -457,7 +457,7 @@
             <a:fld id="{B61BEF0D-F0BB-DE4B-95CE-6DB70DBA9567}" type="datetimeFigureOut">
               <a:rPr lang="en-US" dirty="0"/>
               <a:pPr/>
-              <a:t>5/1/22</a:t>
+              <a:t>5/7/22</a:t>
             </a:fld>
             <a:endParaRPr lang="en-US"/>
           </a:p>
@@ -776,7 +776,7 @@
             <a:fld id="{B61BEF0D-F0BB-DE4B-95CE-6DB70DBA9567}" type="datetimeFigureOut">
               <a:rPr lang="en-US" dirty="0"/>
               <a:pPr/>
-              <a:t>5/1/22</a:t>
+              <a:t>5/7/22</a:t>
             </a:fld>
             <a:endParaRPr lang="en-US"/>
           </a:p>
@@ -1020,7 +1020,7 @@
             <a:fld id="{B61BEF0D-F0BB-DE4B-95CE-6DB70DBA9567}" type="datetimeFigureOut">
               <a:rPr lang="en-US" dirty="0"/>
               <a:pPr/>
-              <a:t>5/1/22</a:t>
+              <a:t>5/7/22</a:t>
             </a:fld>
             <a:endParaRPr lang="en-US"/>
           </a:p>
@@ -1355,7 +1355,7 @@
             <a:fld id="{B61BEF0D-F0BB-DE4B-95CE-6DB70DBA9567}" type="datetimeFigureOut">
               <a:rPr lang="en-US" dirty="0"/>
               <a:pPr/>
-              <a:t>5/1/22</a:t>
+              <a:t>5/7/22</a:t>
             </a:fld>
             <a:endParaRPr lang="en-US"/>
           </a:p>
@@ -1698,7 +1698,7 @@
             <a:fld id="{B61BEF0D-F0BB-DE4B-95CE-6DB70DBA9567}" type="datetimeFigureOut">
               <a:rPr lang="en-US" dirty="0"/>
               <a:pPr/>
-              <a:t>5/1/22</a:t>
+              <a:t>5/7/22</a:t>
             </a:fld>
             <a:endParaRPr lang="en-US"/>
           </a:p>
@@ -2068,7 +2068,7 @@
             <a:fld id="{B61BEF0D-F0BB-DE4B-95CE-6DB70DBA9567}" type="datetimeFigureOut">
               <a:rPr lang="en-US" dirty="0"/>
               <a:pPr/>
-              <a:t>5/1/22</a:t>
+              <a:t>5/7/22</a:t>
             </a:fld>
             <a:endParaRPr lang="en-US"/>
           </a:p>
@@ -2534,7 +2534,7 @@
             <a:fld id="{B61BEF0D-F0BB-DE4B-95CE-6DB70DBA9567}" type="datetimeFigureOut">
               <a:rPr lang="en-US" dirty="0"/>
               <a:pPr/>
-              <a:t>5/1/22</a:t>
+              <a:t>5/7/22</a:t>
             </a:fld>
             <a:endParaRPr lang="en-US"/>
           </a:p>
@@ -2734,7 +2734,7 @@
             <a:fld id="{B61BEF0D-F0BB-DE4B-95CE-6DB70DBA9567}" type="datetimeFigureOut">
               <a:rPr lang="en-US" dirty="0"/>
               <a:pPr/>
-              <a:t>5/1/22</a:t>
+              <a:t>5/7/22</a:t>
             </a:fld>
             <a:endParaRPr lang="en-US"/>
           </a:p>
@@ -2940,7 +2940,7 @@
             <a:fld id="{B61BEF0D-F0BB-DE4B-95CE-6DB70DBA9567}" type="datetimeFigureOut">
               <a:rPr lang="en-US" dirty="0"/>
               <a:pPr/>
-              <a:t>5/1/22</a:t>
+              <a:t>5/7/22</a:t>
             </a:fld>
             <a:endParaRPr lang="en-US"/>
           </a:p>
@@ -3166,7 +3166,7 @@
           <a:p>
             <a:fld id="{52647F38-B617-4D2F-AE0A-013F0C4D2C57}" type="datetimeFigureOut">
               <a:rPr lang="en-US" dirty="0"/>
-              <a:t>5/1/22</a:t>
+              <a:t>5/7/22</a:t>
             </a:fld>
             <a:endParaRPr lang="en-US"/>
           </a:p>
@@ -3409,7 +3409,7 @@
             <a:fld id="{B61BEF0D-F0BB-DE4B-95CE-6DB70DBA9567}" type="datetimeFigureOut">
               <a:rPr lang="en-US" dirty="0"/>
               <a:pPr/>
-              <a:t>5/1/22</a:t>
+              <a:t>5/7/22</a:t>
             </a:fld>
             <a:endParaRPr lang="en-US"/>
           </a:p>
@@ -3700,7 +3700,7 @@
           <a:p>
             <a:fld id="{05BFA754-D5C3-4E66-96A6-867B257F58DC}" type="datetimeFigureOut">
               <a:rPr lang="en-US" dirty="0"/>
-              <a:t>5/1/22</a:t>
+              <a:t>5/7/22</a:t>
             </a:fld>
             <a:endParaRPr lang="en-US"/>
           </a:p>
@@ -4087,7 +4087,7 @@
             <a:fld id="{B61BEF0D-F0BB-DE4B-95CE-6DB70DBA9567}" type="datetimeFigureOut">
               <a:rPr lang="en-US" dirty="0"/>
               <a:pPr/>
-              <a:t>5/1/22</a:t>
+              <a:t>5/7/22</a:t>
             </a:fld>
             <a:endParaRPr lang="en-US"/>
           </a:p>
@@ -4232,7 +4232,7 @@
             <a:fld id="{B61BEF0D-F0BB-DE4B-95CE-6DB70DBA9567}" type="datetimeFigureOut">
               <a:rPr lang="en-US" dirty="0"/>
               <a:pPr/>
-              <a:t>5/1/22</a:t>
+              <a:t>5/7/22</a:t>
             </a:fld>
             <a:endParaRPr lang="en-US"/>
           </a:p>
@@ -4355,7 +4355,7 @@
             <a:fld id="{B61BEF0D-F0BB-DE4B-95CE-6DB70DBA9567}" type="datetimeFigureOut">
               <a:rPr lang="en-US" dirty="0"/>
               <a:pPr/>
-              <a:t>5/1/22</a:t>
+              <a:t>5/7/22</a:t>
             </a:fld>
             <a:endParaRPr lang="en-US"/>
           </a:p>
@@ -4605,7 +4605,7 @@
             <a:fld id="{B61BEF0D-F0BB-DE4B-95CE-6DB70DBA9567}" type="datetimeFigureOut">
               <a:rPr lang="en-US" dirty="0"/>
               <a:pPr/>
-              <a:t>5/1/22</a:t>
+              <a:t>5/7/22</a:t>
             </a:fld>
             <a:endParaRPr lang="en-US"/>
           </a:p>
@@ -4915,7 +4915,7 @@
             <a:fld id="{B61BEF0D-F0BB-DE4B-95CE-6DB70DBA9567}" type="datetimeFigureOut">
               <a:rPr lang="en-US" dirty="0"/>
               <a:pPr/>
-              <a:t>5/1/22</a:t>
+              <a:t>5/7/22</a:t>
             </a:fld>
             <a:endParaRPr lang="en-US"/>
           </a:p>
@@ -5261,7 +5261,7 @@
             <a:fld id="{B61BEF0D-F0BB-DE4B-95CE-6DB70DBA9567}" type="datetimeFigureOut">
               <a:rPr lang="en-US" dirty="0"/>
               <a:pPr/>
-              <a:t>5/1/22</a:t>
+              <a:t>5/7/22</a:t>
             </a:fld>
             <a:endParaRPr lang="en-US"/>
           </a:p>
@@ -5936,7 +5936,7 @@
         </p:nvGraphicFramePr>
         <p:xfrm>
           <a:off x="1295402" y="3176409"/>
-          <a:ext cx="2689499" cy="1415796"/>
+          <a:ext cx="2689499" cy="1415988"/>
         </p:xfrm>
         <a:graphic>
           <a:graphicData uri="http://schemas.openxmlformats.org/drawingml/2006/table">
@@ -6264,7 +6264,7 @@
         </p:nvGraphicFramePr>
         <p:xfrm>
           <a:off x="4676556" y="2852940"/>
-          <a:ext cx="5602561" cy="2306320"/>
+          <a:ext cx="5602561" cy="2306640"/>
         </p:xfrm>
         <a:graphic>
           <a:graphicData uri="http://schemas.openxmlformats.org/drawingml/2006/table">
@@ -12494,6 +12494,27 @@
             </a:r>
           </a:p>
           <a:p>
+            <a:r>
+              <a:rPr lang="en-US" dirty="0"/>
+              <a:t>WHERE Column IS NOT NULL;</a:t>
+            </a:r>
+          </a:p>
+          <a:p>
+            <a:pPr lvl="1"/>
+            <a:r>
+              <a:rPr lang="en-US" dirty="0"/>
+              <a:t>FALSE where Column value is NULL, </a:t>
+            </a:r>
+          </a:p>
+          <a:p>
+            <a:pPr lvl="1"/>
+            <a:r>
+              <a:rPr lang="en-US" dirty="0"/>
+              <a:t>TRUE otherwise</a:t>
+            </a:r>
+            <a:br>
+              <a:rPr lang="en-US" dirty="0"/>
+            </a:br>
             <a:endParaRPr lang="en-US" dirty="0"/>
           </a:p>
           <a:p>
@@ -12513,34 +12534,20 @@
             <a:pPr lvl="1"/>
             <a:r>
               <a:rPr lang="en-US" dirty="0"/>
-              <a:t>NULL when value is NULL; </a:t>
+              <a:t>NULL when value is any other value </a:t>
+            </a:r>
+          </a:p>
+          <a:p>
+            <a:r>
+              <a:rPr lang="en-US" dirty="0"/>
+              <a:t>WHERE Column NOT IN (1,2,3,NULL);</a:t>
             </a:r>
           </a:p>
           <a:p>
             <a:pPr lvl="1"/>
             <a:r>
               <a:rPr lang="en-US" dirty="0"/>
-              <a:t>FALSE with any other value</a:t>
-            </a:r>
-          </a:p>
-          <a:p>
-            <a:endParaRPr lang="en-US" dirty="0"/>
-          </a:p>
-          <a:p>
-            <a:r>
-              <a:rPr lang="en-US" dirty="0"/>
-              <a:t>WHERE Column NOT IN (1,2,3,NULL);</a:t>
-            </a:r>
-          </a:p>
-          <a:p>
-            <a:pPr lvl="1"/>
-            <a:r>
-              <a:rPr lang="en-US" dirty="0"/>
-              <a:t>FALSE </a:t>
-            </a:r>
-            <a:r>
-              <a:rPr lang="en-US"/>
-              <a:t>if value is 1,2, 3</a:t>
+              <a:t>FALSE if value = 1,2,3</a:t>
             </a:r>
           </a:p>
           <a:p>
@@ -12787,7 +12794,7 @@
                                         <p:tgtEl>
                                           <p:spTgt spid="3">
                                             <p:txEl>
-                                              <p:pRg st="4" end="4"/>
+                                              <p:pRg st="3" end="3"/>
                                             </p:txEl>
                                           </p:spTgt>
                                         </p:tgtEl>
@@ -12805,7 +12812,93 @@
                                         <p:tgtEl>
                                           <p:spTgt spid="3">
                                             <p:txEl>
+                                              <p:pRg st="3" end="3"/>
+                                            </p:txEl>
+                                          </p:spTgt>
+                                        </p:tgtEl>
+                                      </p:cBhvr>
+                                    </p:animEffect>
+                                  </p:childTnLst>
+                                </p:cTn>
+                              </p:par>
+                              <p:par>
+                                <p:cTn id="23" presetID="10" presetClass="entr" presetSubtype="0" fill="hold" grpId="0" nodeType="withEffect">
+                                  <p:stCondLst>
+                                    <p:cond delay="0"/>
+                                  </p:stCondLst>
+                                  <p:childTnLst>
+                                    <p:set>
+                                      <p:cBhvr>
+                                        <p:cTn id="24" dur="1" fill="hold">
+                                          <p:stCondLst>
+                                            <p:cond delay="0"/>
+                                          </p:stCondLst>
+                                        </p:cTn>
+                                        <p:tgtEl>
+                                          <p:spTgt spid="3">
+                                            <p:txEl>
                                               <p:pRg st="4" end="4"/>
+                                            </p:txEl>
+                                          </p:spTgt>
+                                        </p:tgtEl>
+                                        <p:attrNameLst>
+                                          <p:attrName>style.visibility</p:attrName>
+                                        </p:attrNameLst>
+                                      </p:cBhvr>
+                                      <p:to>
+                                        <p:strVal val="visible"/>
+                                      </p:to>
+                                    </p:set>
+                                    <p:animEffect transition="in" filter="fade">
+                                      <p:cBhvr>
+                                        <p:cTn id="25" dur="500"/>
+                                        <p:tgtEl>
+                                          <p:spTgt spid="3">
+                                            <p:txEl>
+                                              <p:pRg st="4" end="4"/>
+                                            </p:txEl>
+                                          </p:spTgt>
+                                        </p:tgtEl>
+                                      </p:cBhvr>
+                                    </p:animEffect>
+                                  </p:childTnLst>
+                                </p:cTn>
+                              </p:par>
+                              <p:par>
+                                <p:cTn id="26" presetID="10" presetClass="entr" presetSubtype="0" fill="hold" grpId="0" nodeType="withEffect">
+                                  <p:stCondLst>
+                                    <p:cond delay="0"/>
+                                  </p:stCondLst>
+                                  <p:childTnLst>
+                                    <p:set>
+                                      <p:cBhvr>
+                                        <p:cTn id="27" dur="1" fill="hold">
+                                          <p:stCondLst>
+                                            <p:cond delay="0"/>
+                                          </p:stCondLst>
+                                        </p:cTn>
+                                        <p:tgtEl>
+                                          <p:spTgt spid="3">
+                                            <p:txEl>
+                                              <p:pRg st="5" end="5"/>
+                                            </p:txEl>
+                                          </p:spTgt>
+                                        </p:tgtEl>
+                                        <p:attrNameLst>
+                                          <p:attrName>style.visibility</p:attrName>
+                                        </p:attrNameLst>
+                                      </p:cBhvr>
+                                      <p:to>
+                                        <p:strVal val="visible"/>
+                                      </p:to>
+                                    </p:set>
+                                    <p:animEffect transition="in" filter="fade">
+                                      <p:cBhvr>
+                                        <p:cTn id="28" dur="500"/>
+                                        <p:tgtEl>
+                                          <p:spTgt spid="3">
+                                            <p:txEl>
+                                              <p:pRg st="5" end="5"/>
                                             </p:txEl>
                                           </p:spTgt>
                                         </p:tgtEl>
@@ -12821,26 +12914,26 @@
                     </p:cTn>
                   </p:par>
                   <p:par>
-                    <p:cTn id="23" fill="hold">
+                    <p:cTn id="29" fill="hold">
                       <p:stCondLst>
                         <p:cond delay="indefinite"/>
                       </p:stCondLst>
                       <p:childTnLst>
                         <p:par>
-                          <p:cTn id="24" fill="hold">
+                          <p:cTn id="30" fill="hold">
                             <p:stCondLst>
                               <p:cond delay="0"/>
                             </p:stCondLst>
                             <p:childTnLst>
                               <p:par>
-                                <p:cTn id="25" presetID="10" presetClass="entr" presetSubtype="0" fill="hold" grpId="0" nodeType="clickEffect">
+                                <p:cTn id="31" presetID="10" presetClass="entr" presetSubtype="0" fill="hold" grpId="0" nodeType="clickEffect">
                                   <p:stCondLst>
                                     <p:cond delay="0"/>
                                   </p:stCondLst>
                                   <p:childTnLst>
                                     <p:set>
                                       <p:cBhvr>
-                                        <p:cTn id="26" dur="1" fill="hold">
+                                        <p:cTn id="32" dur="1" fill="hold">
                                           <p:stCondLst>
                                             <p:cond delay="0"/>
                                           </p:stCondLst>
@@ -12848,7 +12941,7 @@
                                         <p:tgtEl>
                                           <p:spTgt spid="3">
                                             <p:txEl>
-                                              <p:pRg st="5" end="5"/>
+                                              <p:pRg st="6" end="6"/>
                                             </p:txEl>
                                           </p:spTgt>
                                         </p:tgtEl>
@@ -12862,11 +12955,11 @@
                                     </p:set>
                                     <p:animEffect transition="in" filter="fade">
                                       <p:cBhvr>
-                                        <p:cTn id="27" dur="500"/>
-                                        <p:tgtEl>
-                                          <p:spTgt spid="3">
-                                            <p:txEl>
-                                              <p:pRg st="5" end="5"/>
+                                        <p:cTn id="33" dur="500"/>
+                                        <p:tgtEl>
+                                          <p:spTgt spid="3">
+                                            <p:txEl>
+                                              <p:pRg st="6" end="6"/>
                                             </p:txEl>
                                           </p:spTgt>
                                         </p:tgtEl>
@@ -12882,26 +12975,26 @@
                     </p:cTn>
                   </p:par>
                   <p:par>
-                    <p:cTn id="28" fill="hold">
+                    <p:cTn id="34" fill="hold">
                       <p:stCondLst>
                         <p:cond delay="indefinite"/>
                       </p:stCondLst>
                       <p:childTnLst>
                         <p:par>
-                          <p:cTn id="29" fill="hold">
+                          <p:cTn id="35" fill="hold">
                             <p:stCondLst>
                               <p:cond delay="0"/>
                             </p:stCondLst>
                             <p:childTnLst>
                               <p:par>
-                                <p:cTn id="30" presetID="10" presetClass="entr" presetSubtype="0" fill="hold" grpId="0" nodeType="clickEffect">
+                                <p:cTn id="36" presetID="10" presetClass="entr" presetSubtype="0" fill="hold" grpId="0" nodeType="clickEffect">
                                   <p:stCondLst>
                                     <p:cond delay="0"/>
                                   </p:stCondLst>
                                   <p:childTnLst>
                                     <p:set>
                                       <p:cBhvr>
-                                        <p:cTn id="31" dur="1" fill="hold">
+                                        <p:cTn id="37" dur="1" fill="hold">
                                           <p:stCondLst>
                                             <p:cond delay="0"/>
                                           </p:stCondLst>
@@ -12909,7 +13002,7 @@
                                         <p:tgtEl>
                                           <p:spTgt spid="3">
                                             <p:txEl>
-                                              <p:pRg st="6" end="6"/>
+                                              <p:pRg st="7" end="7"/>
                                             </p:txEl>
                                           </p:spTgt>
                                         </p:tgtEl>
@@ -12923,11 +13016,11 @@
                                     </p:set>
                                     <p:animEffect transition="in" filter="fade">
                                       <p:cBhvr>
-                                        <p:cTn id="32" dur="500"/>
-                                        <p:tgtEl>
-                                          <p:spTgt spid="3">
-                                            <p:txEl>
-                                              <p:pRg st="6" end="6"/>
+                                        <p:cTn id="38" dur="500"/>
+                                        <p:tgtEl>
+                                          <p:spTgt spid="3">
+                                            <p:txEl>
+                                              <p:pRg st="7" end="7"/>
                                             </p:txEl>
                                           </p:spTgt>
                                         </p:tgtEl>
@@ -12943,26 +13036,26 @@
                     </p:cTn>
                   </p:par>
                   <p:par>
-                    <p:cTn id="33" fill="hold">
+                    <p:cTn id="39" fill="hold">
                       <p:stCondLst>
                         <p:cond delay="indefinite"/>
                       </p:stCondLst>
                       <p:childTnLst>
                         <p:par>
-                          <p:cTn id="34" fill="hold">
+                          <p:cTn id="40" fill="hold">
                             <p:stCondLst>
                               <p:cond delay="0"/>
                             </p:stCondLst>
                             <p:childTnLst>
                               <p:par>
-                                <p:cTn id="35" presetID="10" presetClass="entr" presetSubtype="0" fill="hold" grpId="0" nodeType="clickEffect">
+                                <p:cTn id="41" presetID="10" presetClass="entr" presetSubtype="0" fill="hold" grpId="0" nodeType="clickEffect">
                                   <p:stCondLst>
                                     <p:cond delay="0"/>
                                   </p:stCondLst>
                                   <p:childTnLst>
                                     <p:set>
                                       <p:cBhvr>
-                                        <p:cTn id="36" dur="1" fill="hold">
+                                        <p:cTn id="42" dur="1" fill="hold">
                                           <p:stCondLst>
                                             <p:cond delay="0"/>
                                           </p:stCondLst>
@@ -12970,7 +13063,7 @@
                                         <p:tgtEl>
                                           <p:spTgt spid="3">
                                             <p:txEl>
-                                              <p:pRg st="7" end="7"/>
+                                              <p:pRg st="8" end="8"/>
                                             </p:txEl>
                                           </p:spTgt>
                                         </p:tgtEl>
@@ -12984,11 +13077,11 @@
                                     </p:set>
                                     <p:animEffect transition="in" filter="fade">
                                       <p:cBhvr>
-                                        <p:cTn id="37" dur="500"/>
-                                        <p:tgtEl>
-                                          <p:spTgt spid="3">
-                                            <p:txEl>
-                                              <p:pRg st="7" end="7"/>
+                                        <p:cTn id="43" dur="500"/>
+                                        <p:tgtEl>
+                                          <p:spTgt spid="3">
+                                            <p:txEl>
+                                              <p:pRg st="8" end="8"/>
                                             </p:txEl>
                                           </p:spTgt>
                                         </p:tgtEl>
@@ -13004,26 +13097,26 @@
                     </p:cTn>
                   </p:par>
                   <p:par>
-                    <p:cTn id="38" fill="hold">
+                    <p:cTn id="44" fill="hold">
                       <p:stCondLst>
                         <p:cond delay="indefinite"/>
                       </p:stCondLst>
                       <p:childTnLst>
                         <p:par>
-                          <p:cTn id="39" fill="hold">
+                          <p:cTn id="45" fill="hold">
                             <p:stCondLst>
                               <p:cond delay="0"/>
                             </p:stCondLst>
                             <p:childTnLst>
                               <p:par>
-                                <p:cTn id="40" presetID="10" presetClass="entr" presetSubtype="0" fill="hold" grpId="0" nodeType="clickEffect">
+                                <p:cTn id="46" presetID="10" presetClass="entr" presetSubtype="0" fill="hold" grpId="0" nodeType="clickEffect">
                                   <p:stCondLst>
                                     <p:cond delay="0"/>
                                   </p:stCondLst>
                                   <p:childTnLst>
                                     <p:set>
                                       <p:cBhvr>
-                                        <p:cTn id="41" dur="1" fill="hold">
+                                        <p:cTn id="47" dur="1" fill="hold">
                                           <p:stCondLst>
                                             <p:cond delay="0"/>
                                           </p:stCondLst>
@@ -13045,7 +13138,7 @@
                                     </p:set>
                                     <p:animEffect transition="in" filter="fade">
                                       <p:cBhvr>
-                                        <p:cTn id="42" dur="500"/>
+                                        <p:cTn id="48" dur="500"/>
                                         <p:tgtEl>
                                           <p:spTgt spid="3">
                                             <p:txEl>
@@ -13059,14 +13152,14 @@
                                 </p:cTn>
                               </p:par>
                               <p:par>
-                                <p:cTn id="43" presetID="10" presetClass="entr" presetSubtype="0" fill="hold" grpId="0" nodeType="withEffect">
+                                <p:cTn id="49" presetID="10" presetClass="entr" presetSubtype="0" fill="hold" grpId="0" nodeType="withEffect">
                                   <p:stCondLst>
                                     <p:cond delay="0"/>
                                   </p:stCondLst>
                                   <p:childTnLst>
                                     <p:set>
                                       <p:cBhvr>
-                                        <p:cTn id="44" dur="1" fill="hold">
+                                        <p:cTn id="50" dur="1" fill="hold">
                                           <p:stCondLst>
                                             <p:cond delay="0"/>
                                           </p:stCondLst>
@@ -13088,7 +13181,7 @@
                                     </p:set>
                                     <p:animEffect transition="in" filter="fade">
                                       <p:cBhvr>
-                                        <p:cTn id="45" dur="500"/>
+                                        <p:cTn id="51" dur="500"/>
                                         <p:tgtEl>
                                           <p:spTgt spid="3">
                                             <p:txEl>
@@ -13108,26 +13201,26 @@
                     </p:cTn>
                   </p:par>
                   <p:par>
-                    <p:cTn id="46" fill="hold">
+                    <p:cTn id="52" fill="hold">
                       <p:stCondLst>
                         <p:cond delay="indefinite"/>
                       </p:stCondLst>
                       <p:childTnLst>
                         <p:par>
-                          <p:cTn id="47" fill="hold">
+                          <p:cTn id="53" fill="hold">
                             <p:stCondLst>
                               <p:cond delay="0"/>
                             </p:stCondLst>
                             <p:childTnLst>
                               <p:par>
-                                <p:cTn id="48" presetID="10" presetClass="entr" presetSubtype="0" fill="hold" grpId="0" nodeType="clickEffect">
+                                <p:cTn id="54" presetID="10" presetClass="entr" presetSubtype="0" fill="hold" grpId="0" nodeType="clickEffect">
                                   <p:stCondLst>
                                     <p:cond delay="0"/>
                                   </p:stCondLst>
                                   <p:childTnLst>
                                     <p:set>
                                       <p:cBhvr>
-                                        <p:cTn id="49" dur="1" fill="hold">
+                                        <p:cTn id="55" dur="1" fill="hold">
                                           <p:stCondLst>
                                             <p:cond delay="0"/>
                                           </p:stCondLst>
@@ -13149,7 +13242,7 @@
                                     </p:set>
                                     <p:animEffect transition="in" filter="fade">
                                       <p:cBhvr>
-                                        <p:cTn id="50" dur="500"/>
+                                        <p:cTn id="56" dur="500"/>
                                         <p:tgtEl>
                                           <p:spTgt spid="3">
                                             <p:txEl>

</xml_diff>